<commit_message>
Added Test Word in Powerpoint
Added the word test
</commit_message>
<xml_diff>
--- a/INTRODUCTION TO GITLAB.pptx
+++ b/INTRODUCTION TO GITLAB.pptx
@@ -117,7 +117,16 @@
       </a:defRPr>
     </a:lvl9pPr>
   </p:defaultTextStyle>
+  <p:extLst>
+    <p:ext uri="{EFAFB233-063F-42B5-8137-9DF3F51BA10A}">
+      <p15:sldGuideLst xmlns:p15="http://schemas.microsoft.com/office/powerpoint/2012/main"/>
+    </p:ext>
+  </p:extLst>
 </p:presentation>
+</file>
+
+<file path=ppt/revisionInfo.xml><?xml version="1.0" encoding="utf-8"?>
+<p1510:revInfo xmlns:a="http://schemas.openxmlformats.org/drawingml/2006/main" xmlns:r="http://schemas.openxmlformats.org/officeDocument/2006/relationships" xmlns:p1510="http://schemas.microsoft.com/office/powerpoint/2015/10/main"/>
 </file>
 
 <file path=ppt/diagrams/colors1.xml><?xml version="1.0" encoding="utf-8"?>
@@ -6137,7 +6146,7 @@
           <a:p>
             <a:fld id="{4AAD347D-5ACD-4C99-B74B-A9C85AD731AF}" type="datetimeFigureOut">
               <a:rPr lang="en-US" dirty="0"/>
-              <a:t>11/21/2017</a:t>
+              <a:t>12/6/2017</a:t>
             </a:fld>
             <a:endParaRPr lang="en-US" dirty="0"/>
           </a:p>
@@ -6407,7 +6416,7 @@
           <a:p>
             <a:fld id="{4509A250-FF31-4206-8172-F9D3106AACB1}" type="datetimeFigureOut">
               <a:rPr lang="en-US" dirty="0"/>
-              <a:t>11/21/2017</a:t>
+              <a:t>12/6/2017</a:t>
             </a:fld>
             <a:endParaRPr lang="en-US" dirty="0"/>
           </a:p>
@@ -6596,7 +6605,7 @@
           <a:p>
             <a:fld id="{4509A250-FF31-4206-8172-F9D3106AACB1}" type="datetimeFigureOut">
               <a:rPr lang="en-US" dirty="0"/>
-              <a:t>11/21/2017</a:t>
+              <a:t>12/6/2017</a:t>
             </a:fld>
             <a:endParaRPr lang="en-US" dirty="0"/>
           </a:p>
@@ -6864,7 +6873,7 @@
           <a:p>
             <a:fld id="{4509A250-FF31-4206-8172-F9D3106AACB1}" type="datetimeFigureOut">
               <a:rPr lang="en-US" dirty="0"/>
-              <a:t>11/21/2017</a:t>
+              <a:t>12/6/2017</a:t>
             </a:fld>
             <a:endParaRPr lang="en-US" dirty="0"/>
           </a:p>
@@ -7200,7 +7209,7 @@
           <a:p>
             <a:fld id="{4509A250-FF31-4206-8172-F9D3106AACB1}" type="datetimeFigureOut">
               <a:rPr lang="en-US" dirty="0"/>
-              <a:t>11/21/2017</a:t>
+              <a:t>12/6/2017</a:t>
             </a:fld>
             <a:endParaRPr lang="en-US" dirty="0"/>
           </a:p>
@@ -7818,7 +7827,7 @@
           <a:p>
             <a:fld id="{4509A250-FF31-4206-8172-F9D3106AACB1}" type="datetimeFigureOut">
               <a:rPr lang="en-US" dirty="0"/>
-              <a:t>11/21/2017</a:t>
+              <a:t>12/6/2017</a:t>
             </a:fld>
             <a:endParaRPr lang="en-US" dirty="0"/>
           </a:p>
@@ -8673,7 +8682,7 @@
           <a:p>
             <a:fld id="{4509A250-FF31-4206-8172-F9D3106AACB1}" type="datetimeFigureOut">
               <a:rPr lang="en-US" dirty="0"/>
-              <a:t>11/21/2017</a:t>
+              <a:t>12/6/2017</a:t>
             </a:fld>
             <a:endParaRPr lang="en-US" dirty="0"/>
           </a:p>
@@ -8838,7 +8847,7 @@
           <a:p>
             <a:fld id="{4509A250-FF31-4206-8172-F9D3106AACB1}" type="datetimeFigureOut">
               <a:rPr lang="en-US" dirty="0"/>
-              <a:t>11/21/2017</a:t>
+              <a:t>12/6/2017</a:t>
             </a:fld>
             <a:endParaRPr lang="en-US" dirty="0"/>
           </a:p>
@@ -9013,7 +9022,7 @@
           <a:p>
             <a:fld id="{4509A250-FF31-4206-8172-F9D3106AACB1}" type="datetimeFigureOut">
               <a:rPr lang="en-US" dirty="0"/>
-              <a:t>11/21/2017</a:t>
+              <a:t>12/6/2017</a:t>
             </a:fld>
             <a:endParaRPr lang="en-US" dirty="0"/>
           </a:p>
@@ -9178,7 +9187,7 @@
           <a:p>
             <a:fld id="{4509A250-FF31-4206-8172-F9D3106AACB1}" type="datetimeFigureOut">
               <a:rPr lang="en-US" dirty="0"/>
-              <a:t>11/21/2017</a:t>
+              <a:t>12/6/2017</a:t>
             </a:fld>
             <a:endParaRPr lang="en-US" dirty="0"/>
           </a:p>
@@ -9420,7 +9429,7 @@
           <a:p>
             <a:fld id="{9796027F-7875-4030-9381-8BD8C4F21935}" type="datetimeFigureOut">
               <a:rPr lang="en-US" dirty="0"/>
-              <a:t>11/21/2017</a:t>
+              <a:t>12/6/2017</a:t>
             </a:fld>
             <a:endParaRPr lang="en-US" dirty="0"/>
           </a:p>
@@ -9707,7 +9716,7 @@
           <a:p>
             <a:fld id="{9796027F-7875-4030-9381-8BD8C4F21935}" type="datetimeFigureOut">
               <a:rPr lang="en-US" dirty="0"/>
-              <a:t>11/21/2017</a:t>
+              <a:t>12/6/2017</a:t>
             </a:fld>
             <a:endParaRPr lang="en-US" dirty="0"/>
           </a:p>
@@ -10146,7 +10155,7 @@
           <a:p>
             <a:fld id="{9796027F-7875-4030-9381-8BD8C4F21935}" type="datetimeFigureOut">
               <a:rPr lang="en-US" dirty="0"/>
-              <a:t>11/21/2017</a:t>
+              <a:t>12/6/2017</a:t>
             </a:fld>
             <a:endParaRPr lang="en-US" dirty="0"/>
           </a:p>
@@ -10259,7 +10268,7 @@
           <a:p>
             <a:fld id="{4509A250-FF31-4206-8172-F9D3106AACB1}" type="datetimeFigureOut">
               <a:rPr lang="en-US" dirty="0"/>
-              <a:t>11/21/2017</a:t>
+              <a:t>12/6/2017</a:t>
             </a:fld>
             <a:endParaRPr lang="en-US" dirty="0"/>
           </a:p>
@@ -10349,7 +10358,7 @@
           <a:p>
             <a:fld id="{4509A250-FF31-4206-8172-F9D3106AACB1}" type="datetimeFigureOut">
               <a:rPr lang="en-US" dirty="0"/>
-              <a:t>11/21/2017</a:t>
+              <a:t>12/6/2017</a:t>
             </a:fld>
             <a:endParaRPr lang="en-US" dirty="0"/>
           </a:p>
@@ -10623,7 +10632,7 @@
           <a:p>
             <a:fld id="{4509A250-FF31-4206-8172-F9D3106AACB1}" type="datetimeFigureOut">
               <a:rPr lang="en-US" dirty="0"/>
-              <a:t>11/21/2017</a:t>
+              <a:t>12/6/2017</a:t>
             </a:fld>
             <a:endParaRPr lang="en-US" dirty="0"/>
           </a:p>
@@ -10893,7 +10902,7 @@
           <a:p>
             <a:fld id="{4509A250-FF31-4206-8172-F9D3106AACB1}" type="datetimeFigureOut">
               <a:rPr lang="en-US" dirty="0"/>
-              <a:t>11/21/2017</a:t>
+              <a:t>12/6/2017</a:t>
             </a:fld>
             <a:endParaRPr lang="en-US" dirty="0"/>
           </a:p>
@@ -11317,7 +11326,7 @@
           <a:p>
             <a:fld id="{4AAD347D-5ACD-4C99-B74B-A9C85AD731AF}" type="datetimeFigureOut">
               <a:rPr lang="en-US" dirty="0"/>
-              <a:t>11/21/2017</a:t>
+              <a:t>12/6/2017</a:t>
             </a:fld>
             <a:endParaRPr lang="en-US" dirty="0"/>
           </a:p>
@@ -12645,7 +12654,10 @@
           <a:bodyPr/>
           <a:lstStyle/>
           <a:p>
-            <a:endParaRPr lang="en-US"/>
+            <a:r>
+              <a:rPr lang="en-US"/>
+              <a:t>test</a:t>
+            </a:r>
           </a:p>
         </p:txBody>
       </p:sp>

</xml_diff>